<commit_message>
Pitch + Homepage + Lizenz
</commit_message>
<xml_diff>
--- a/Pitch.pptx
+++ b/Pitch.pptx
@@ -2,10 +2,10 @@
 <file path=ppt/presentation.xml><?xml version="1.0" encoding="utf-8"?>
 <p:presentation xmlns:a="http://schemas.openxmlformats.org/drawingml/2006/main" xmlns:r="http://schemas.openxmlformats.org/officeDocument/2006/relationships" xmlns:p="http://schemas.openxmlformats.org/presentationml/2006/main" saveSubsetFonts="1">
   <p:sldMasterIdLst>
-    <p:sldMasterId id="2147483648" r:id="rId4"/>
+    <p:sldMasterId id="2147483648" r:id="rId6"/>
   </p:sldMasterIdLst>
   <p:sldIdLst>
-    <p:sldId id="257" r:id="rId5"/>
+    <p:sldId id="257" r:id="rId7"/>
   </p:sldIdLst>
   <p:sldSz cx="12192000" cy="6858000"/>
   <p:notesSz cx="6858000" cy="9144000"/>
@@ -259,7 +259,7 @@
           <a:p>
             <a:fld id="{A283A367-2733-4026-AD71-9D3ADEE81B0C}" type="datetimeFigureOut">
               <a:rPr lang="de-DE" smtClean="0"/>
-              <a:t>06.09.2018</a:t>
+              <a:t>07.09.2018</a:t>
             </a:fld>
             <a:endParaRPr lang="de-DE"/>
           </a:p>
@@ -457,7 +457,7 @@
           <a:p>
             <a:fld id="{A283A367-2733-4026-AD71-9D3ADEE81B0C}" type="datetimeFigureOut">
               <a:rPr lang="de-DE" smtClean="0"/>
-              <a:t>06.09.2018</a:t>
+              <a:t>07.09.2018</a:t>
             </a:fld>
             <a:endParaRPr lang="de-DE"/>
           </a:p>
@@ -665,7 +665,7 @@
           <a:p>
             <a:fld id="{A283A367-2733-4026-AD71-9D3ADEE81B0C}" type="datetimeFigureOut">
               <a:rPr lang="de-DE" smtClean="0"/>
-              <a:t>06.09.2018</a:t>
+              <a:t>07.09.2018</a:t>
             </a:fld>
             <a:endParaRPr lang="de-DE"/>
           </a:p>
@@ -863,7 +863,7 @@
           <a:p>
             <a:fld id="{A283A367-2733-4026-AD71-9D3ADEE81B0C}" type="datetimeFigureOut">
               <a:rPr lang="de-DE" smtClean="0"/>
-              <a:t>06.09.2018</a:t>
+              <a:t>07.09.2018</a:t>
             </a:fld>
             <a:endParaRPr lang="de-DE"/>
           </a:p>
@@ -1138,7 +1138,7 @@
           <a:p>
             <a:fld id="{A283A367-2733-4026-AD71-9D3ADEE81B0C}" type="datetimeFigureOut">
               <a:rPr lang="de-DE" smtClean="0"/>
-              <a:t>06.09.2018</a:t>
+              <a:t>07.09.2018</a:t>
             </a:fld>
             <a:endParaRPr lang="de-DE"/>
           </a:p>
@@ -1403,7 +1403,7 @@
           <a:p>
             <a:fld id="{A283A367-2733-4026-AD71-9D3ADEE81B0C}" type="datetimeFigureOut">
               <a:rPr lang="de-DE" smtClean="0"/>
-              <a:t>06.09.2018</a:t>
+              <a:t>07.09.2018</a:t>
             </a:fld>
             <a:endParaRPr lang="de-DE"/>
           </a:p>
@@ -1815,7 +1815,7 @@
           <a:p>
             <a:fld id="{A283A367-2733-4026-AD71-9D3ADEE81B0C}" type="datetimeFigureOut">
               <a:rPr lang="de-DE" smtClean="0"/>
-              <a:t>06.09.2018</a:t>
+              <a:t>07.09.2018</a:t>
             </a:fld>
             <a:endParaRPr lang="de-DE"/>
           </a:p>
@@ -1956,7 +1956,7 @@
           <a:p>
             <a:fld id="{A283A367-2733-4026-AD71-9D3ADEE81B0C}" type="datetimeFigureOut">
               <a:rPr lang="de-DE" smtClean="0"/>
-              <a:t>06.09.2018</a:t>
+              <a:t>07.09.2018</a:t>
             </a:fld>
             <a:endParaRPr lang="de-DE"/>
           </a:p>
@@ -2069,7 +2069,7 @@
           <a:p>
             <a:fld id="{A283A367-2733-4026-AD71-9D3ADEE81B0C}" type="datetimeFigureOut">
               <a:rPr lang="de-DE" smtClean="0"/>
-              <a:t>06.09.2018</a:t>
+              <a:t>07.09.2018</a:t>
             </a:fld>
             <a:endParaRPr lang="de-DE"/>
           </a:p>
@@ -2380,7 +2380,7 @@
           <a:p>
             <a:fld id="{A283A367-2733-4026-AD71-9D3ADEE81B0C}" type="datetimeFigureOut">
               <a:rPr lang="de-DE" smtClean="0"/>
-              <a:t>06.09.2018</a:t>
+              <a:t>07.09.2018</a:t>
             </a:fld>
             <a:endParaRPr lang="de-DE"/>
           </a:p>
@@ -2668,7 +2668,7 @@
           <a:p>
             <a:fld id="{A283A367-2733-4026-AD71-9D3ADEE81B0C}" type="datetimeFigureOut">
               <a:rPr lang="de-DE" smtClean="0"/>
-              <a:t>06.09.2018</a:t>
+              <a:t>07.09.2018</a:t>
             </a:fld>
             <a:endParaRPr lang="de-DE"/>
           </a:p>
@@ -2909,7 +2909,7 @@
           <a:p>
             <a:fld id="{A283A367-2733-4026-AD71-9D3ADEE81B0C}" type="datetimeFigureOut">
               <a:rPr lang="de-DE" smtClean="0"/>
-              <a:t>06.09.2018</a:t>
+              <a:t>07.09.2018</a:t>
             </a:fld>
             <a:endParaRPr lang="de-DE"/>
           </a:p>
@@ -3391,7 +3391,7 @@
             <a:r>
               <a:rPr lang="de-DE" b="1" dirty="0" err="1">
                 <a:solidFill>
-                  <a:schemeClr val="bg1"/>
+                  <a:srgbClr val="876748"/>
                 </a:solidFill>
                 <a:latin typeface="Trebuchet MS" panose="020B0603020202020204" pitchFamily="34" charset="0"/>
               </a:rPr>
@@ -3400,7 +3400,7 @@
             <a:r>
               <a:rPr lang="de-DE" b="1" dirty="0">
                 <a:solidFill>
-                  <a:schemeClr val="bg1"/>
+                  <a:srgbClr val="876748"/>
                 </a:solidFill>
                 <a:latin typeface="Trebuchet MS" panose="020B0603020202020204" pitchFamily="34" charset="0"/>
               </a:rPr>
@@ -3409,7 +3409,7 @@
             <a:r>
               <a:rPr lang="de-DE" b="1" dirty="0" err="1">
                 <a:solidFill>
-                  <a:schemeClr val="bg1"/>
+                  <a:srgbClr val="876748"/>
                 </a:solidFill>
                 <a:latin typeface="Trebuchet MS" panose="020B0603020202020204" pitchFamily="34" charset="0"/>
               </a:rPr>
@@ -3418,7 +3418,7 @@
             <a:r>
               <a:rPr lang="de-DE" b="1" dirty="0">
                 <a:solidFill>
-                  <a:schemeClr val="bg1"/>
+                  <a:srgbClr val="876748"/>
                 </a:solidFill>
                 <a:latin typeface="Trebuchet MS" panose="020B0603020202020204" pitchFamily="34" charset="0"/>
               </a:rPr>
@@ -3610,7 +3610,7 @@
         </p:blipFill>
         <p:spPr bwMode="auto">
           <a:xfrm>
-            <a:off x="698997" y="820382"/>
+            <a:off x="386208" y="812121"/>
             <a:ext cx="2280657" cy="656230"/>
           </a:xfrm>
           <a:prstGeom prst="rect">
@@ -4928,7 +4928,7 @@
             <a:r>
               <a:rPr lang="de-DE" b="1" dirty="0">
                 <a:solidFill>
-                  <a:schemeClr val="bg1"/>
+                  <a:srgbClr val="B79B83"/>
                 </a:solidFill>
                 <a:latin typeface="Trebuchet MS" panose="020B0603020202020204" pitchFamily="34" charset="0"/>
               </a:rPr>
@@ -4937,7 +4937,7 @@
             <a:r>
               <a:rPr lang="de-DE" b="1" dirty="0" err="1">
                 <a:solidFill>
-                  <a:schemeClr val="bg1"/>
+                  <a:srgbClr val="B79B83"/>
                 </a:solidFill>
                 <a:latin typeface="Trebuchet MS" panose="020B0603020202020204" pitchFamily="34" charset="0"/>
               </a:rPr>
@@ -4946,7 +4946,7 @@
             <a:r>
               <a:rPr lang="de-DE" b="1" dirty="0">
                 <a:solidFill>
-                  <a:schemeClr val="bg1"/>
+                  <a:srgbClr val="B79B83"/>
                 </a:solidFill>
                 <a:latin typeface="Trebuchet MS" panose="020B0603020202020204" pitchFamily="34" charset="0"/>
               </a:rPr>
@@ -4955,7 +4955,7 @@
             <a:br>
               <a:rPr lang="de-DE" b="1" dirty="0">
                 <a:solidFill>
-                  <a:schemeClr val="bg1"/>
+                  <a:srgbClr val="B79B83"/>
                 </a:solidFill>
                 <a:latin typeface="Trebuchet MS" panose="020B0603020202020204" pitchFamily="34" charset="0"/>
               </a:rPr>
@@ -4963,7 +4963,7 @@
             <a:r>
               <a:rPr lang="de-DE" b="1" dirty="0">
                 <a:solidFill>
-                  <a:schemeClr val="bg1"/>
+                  <a:srgbClr val="B79B83"/>
                 </a:solidFill>
                 <a:latin typeface="Trebuchet MS" panose="020B0603020202020204" pitchFamily="34" charset="0"/>
               </a:rPr>
@@ -4972,7 +4972,7 @@
             <a:br>
               <a:rPr lang="de-DE" b="1" dirty="0">
                 <a:solidFill>
-                  <a:schemeClr val="bg1"/>
+                  <a:srgbClr val="B79B83"/>
                 </a:solidFill>
                 <a:latin typeface="Trebuchet MS" panose="020B0603020202020204" pitchFamily="34" charset="0"/>
               </a:rPr>
@@ -4980,7 +4980,7 @@
             <a:r>
               <a:rPr lang="de-DE" b="1" dirty="0">
                 <a:solidFill>
-                  <a:schemeClr val="bg1"/>
+                  <a:srgbClr val="B79B83"/>
                 </a:solidFill>
                 <a:latin typeface="Trebuchet MS" panose="020B0603020202020204" pitchFamily="34" charset="0"/>
               </a:rPr>
@@ -4988,7 +4988,7 @@
             </a:r>
             <a:endParaRPr lang="de-DE" dirty="0">
               <a:solidFill>
-                <a:schemeClr val="bg1"/>
+                <a:srgbClr val="B79B83"/>
               </a:solidFill>
             </a:endParaRPr>
           </a:p>
@@ -5063,6 +5063,53 @@
           <a:prstGeom prst="rect">
             <a:avLst/>
           </a:prstGeom>
+        </p:spPr>
+      </p:pic>
+      <p:pic>
+        <p:nvPicPr>
+          <p:cNvPr id="2" name="Picture 2" descr="Bildergebnis fÃ¼r internet explorer logo">
+            <a:extLst>
+              <a:ext uri="{FF2B5EF4-FFF2-40B4-BE49-F238E27FC236}">
+                <a16:creationId xmlns:a16="http://schemas.microsoft.com/office/drawing/2014/main" id="{934BBE21-59F1-4F6E-BB0F-3EDB7F0732B9}"/>
+              </a:ext>
+            </a:extLst>
+          </p:cNvPr>
+          <p:cNvPicPr>
+            <a:picLocks noChangeAspect="1" noChangeArrowheads="1"/>
+          </p:cNvPicPr>
+          <p:nvPr/>
+        </p:nvPicPr>
+        <p:blipFill>
+          <a:blip r:embed="rId15">
+            <a:extLst>
+              <a:ext uri="{28A0092B-C50C-407E-A947-70E740481C1C}">
+                <a14:useLocalDpi xmlns:a14="http://schemas.microsoft.com/office/drawing/2010/main" val="0"/>
+              </a:ext>
+            </a:extLst>
+          </a:blip>
+          <a:srcRect/>
+          <a:stretch>
+            <a:fillRect/>
+          </a:stretch>
+        </p:blipFill>
+        <p:spPr bwMode="auto">
+          <a:xfrm>
+            <a:off x="2660504" y="794300"/>
+            <a:ext cx="622831" cy="622831"/>
+          </a:xfrm>
+          <a:prstGeom prst="rect">
+            <a:avLst/>
+          </a:prstGeom>
+          <a:noFill/>
+          <a:extLst>
+            <a:ext uri="{909E8E84-426E-40DD-AFC4-6F175D3DCCD1}">
+              <a14:hiddenFill xmlns:a14="http://schemas.microsoft.com/office/drawing/2010/main">
+                <a:solidFill>
+                  <a:srgbClr val="FFFFFF"/>
+                </a:solidFill>
+              </a14:hiddenFill>
+            </a:ext>
+          </a:extLst>
         </p:spPr>
       </p:pic>
     </p:spTree>
@@ -5373,17 +5420,7 @@
 </a:theme>
 </file>
 
-<file path=customXml/item1.xml>
-</file>
-
-<file path=customXml/item2.xml><?xml version="1.0" encoding="utf-8"?>
-<Application xmlns="http://www.sap.com/cof/powerpoint/application">
-  <Version>2</Version>
-  <Revision>2.5.201.74495</Revision>
-</Application>
-</file>
-
-<file path=customXml/item3.xml><?xml version="1.0" encoding="utf-8"?>
+<file path=customXml/item1.xml><?xml version="1.0" encoding="utf-8"?>
 <Application xmlns="http://www.sap.com/cof/ao/powerpoint/application">
   <com.sap.ip.bi.pioneer>
     <Version>4</Version>
@@ -5401,8 +5438,28 @@
 </Application>
 </file>
 
+<file path=customXml/item2.xml><?xml version="1.0" encoding="utf-8"?>
+<Application xmlns="http://www.sap.com/cof/powerpoint/application">
+  <Version>2</Version>
+  <Revision>2.5.201.74495</Revision>
+</Application>
+</file>
+
+<file path=customXml/item3.xml>
+</file>
+
+<file path=customXml/item4.xml>
+</file>
+
+<file path=customXml/item5.xml>
+</file>
+
 <file path=customXml/itemProps1.xml><?xml version="1.0" encoding="utf-8"?>
-<ds:datastoreItem xmlns:ds="http://schemas.openxmlformats.org/officeDocument/2006/customXml" ds:itemID="{B6BA90CD-7BA2-4A10-A93D-C5311E803BD6}"/>
+<ds:datastoreItem xmlns:ds="http://schemas.openxmlformats.org/officeDocument/2006/customXml" ds:itemID="{44723FA6-B1A5-4CA4-AE18-8FB0E9AA9608}">
+  <ds:schemaRefs>
+    <ds:schemaRef ds:uri="http://www.sap.com/cof/ao/powerpoint/application"/>
+  </ds:schemaRefs>
+</ds:datastoreItem>
 </file>
 
 <file path=customXml/itemProps2.xml><?xml version="1.0" encoding="utf-8"?>
@@ -5414,9 +5471,13 @@
 </file>
 
 <file path=customXml/itemProps3.xml><?xml version="1.0" encoding="utf-8"?>
-<ds:datastoreItem xmlns:ds="http://schemas.openxmlformats.org/officeDocument/2006/customXml" ds:itemID="{44723FA6-B1A5-4CA4-AE18-8FB0E9AA9608}">
-  <ds:schemaRefs>
-    <ds:schemaRef ds:uri="http://www.sap.com/cof/ao/powerpoint/application"/>
-  </ds:schemaRefs>
-</ds:datastoreItem>
+<ds:datastoreItem xmlns:ds="http://schemas.openxmlformats.org/officeDocument/2006/customXml" ds:itemID="{BDA0C33A-4E85-4045-9A22-D0C1D2A9BB4D}"/>
+</file>
+
+<file path=customXml/itemProps4.xml><?xml version="1.0" encoding="utf-8"?>
+<ds:datastoreItem xmlns:ds="http://schemas.openxmlformats.org/officeDocument/2006/customXml" ds:itemID="{B6BA90CD-7BA2-4A10-A93D-C5311E803BD6}"/>
+</file>
+
+<file path=customXml/itemProps5.xml><?xml version="1.0" encoding="utf-8"?>
+<ds:datastoreItem xmlns:ds="http://schemas.openxmlformats.org/officeDocument/2006/customXml" ds:itemID="{2E4677D1-6936-4BF1-A595-120AC79AD739}"/>
 </file>
</xml_diff>